<commit_message>
muda a forma de calcular o novo ponto
</commit_message>
<xml_diff>
--- a/spiral/esquema-parametros-aleatorios.pptx
+++ b/spiral/esquema-parametros-aleatorios.pptx
@@ -6,6 +6,7 @@
   </p:sldMasterIdLst>
   <p:sldIdLst>
     <p:sldId id="256" r:id="rId2"/>
+    <p:sldId id="257" r:id="rId3"/>
   </p:sldIdLst>
   <p:sldSz cx="9144000" cy="6858000" type="screen4x3"/>
   <p:notesSz cx="6858000" cy="9144000"/>
@@ -104,6 +105,11 @@
       </a:defRPr>
     </a:lvl9pPr>
   </p:defaultTextStyle>
+  <p:extLst>
+    <p:ext uri="{EFAFB233-063F-42B5-8137-9DF3F51BA10A}">
+      <p15:sldGuideLst xmlns:p15="http://schemas.microsoft.com/office/powerpoint/2012/main"/>
+    </p:ext>
+  </p:extLst>
 </p:presentation>
 </file>
 
@@ -238,7 +244,7 @@
           <a:p>
             <a:fld id="{5A81D81A-14AD-CE44-B3D9-33FA66F0BC38}" type="datetimeFigureOut">
               <a:rPr lang="en-US" smtClean="0"/>
-              <a:t>10/25/24</a:t>
+              <a:t>10/31/24</a:t>
             </a:fld>
             <a:endParaRPr lang="en-US"/>
           </a:p>
@@ -408,7 +414,7 @@
           <a:p>
             <a:fld id="{5A81D81A-14AD-CE44-B3D9-33FA66F0BC38}" type="datetimeFigureOut">
               <a:rPr lang="en-US" smtClean="0"/>
-              <a:t>10/25/24</a:t>
+              <a:t>10/31/24</a:t>
             </a:fld>
             <a:endParaRPr lang="en-US"/>
           </a:p>
@@ -588,7 +594,7 @@
           <a:p>
             <a:fld id="{5A81D81A-14AD-CE44-B3D9-33FA66F0BC38}" type="datetimeFigureOut">
               <a:rPr lang="en-US" smtClean="0"/>
-              <a:t>10/25/24</a:t>
+              <a:t>10/31/24</a:t>
             </a:fld>
             <a:endParaRPr lang="en-US"/>
           </a:p>
@@ -758,7 +764,7 @@
           <a:p>
             <a:fld id="{5A81D81A-14AD-CE44-B3D9-33FA66F0BC38}" type="datetimeFigureOut">
               <a:rPr lang="en-US" smtClean="0"/>
-              <a:t>10/25/24</a:t>
+              <a:t>10/31/24</a:t>
             </a:fld>
             <a:endParaRPr lang="en-US"/>
           </a:p>
@@ -1004,7 +1010,7 @@
           <a:p>
             <a:fld id="{5A81D81A-14AD-CE44-B3D9-33FA66F0BC38}" type="datetimeFigureOut">
               <a:rPr lang="en-US" smtClean="0"/>
-              <a:t>10/25/24</a:t>
+              <a:t>10/31/24</a:t>
             </a:fld>
             <a:endParaRPr lang="en-US"/>
           </a:p>
@@ -1236,7 +1242,7 @@
           <a:p>
             <a:fld id="{5A81D81A-14AD-CE44-B3D9-33FA66F0BC38}" type="datetimeFigureOut">
               <a:rPr lang="en-US" smtClean="0"/>
-              <a:t>10/25/24</a:t>
+              <a:t>10/31/24</a:t>
             </a:fld>
             <a:endParaRPr lang="en-US"/>
           </a:p>
@@ -1603,7 +1609,7 @@
           <a:p>
             <a:fld id="{5A81D81A-14AD-CE44-B3D9-33FA66F0BC38}" type="datetimeFigureOut">
               <a:rPr lang="en-US" smtClean="0"/>
-              <a:t>10/25/24</a:t>
+              <a:t>10/31/24</a:t>
             </a:fld>
             <a:endParaRPr lang="en-US"/>
           </a:p>
@@ -1721,7 +1727,7 @@
           <a:p>
             <a:fld id="{5A81D81A-14AD-CE44-B3D9-33FA66F0BC38}" type="datetimeFigureOut">
               <a:rPr lang="en-US" smtClean="0"/>
-              <a:t>10/25/24</a:t>
+              <a:t>10/31/24</a:t>
             </a:fld>
             <a:endParaRPr lang="en-US"/>
           </a:p>
@@ -1816,7 +1822,7 @@
           <a:p>
             <a:fld id="{5A81D81A-14AD-CE44-B3D9-33FA66F0BC38}" type="datetimeFigureOut">
               <a:rPr lang="en-US" smtClean="0"/>
-              <a:t>10/25/24</a:t>
+              <a:t>10/31/24</a:t>
             </a:fld>
             <a:endParaRPr lang="en-US"/>
           </a:p>
@@ -2093,7 +2099,7 @@
           <a:p>
             <a:fld id="{5A81D81A-14AD-CE44-B3D9-33FA66F0BC38}" type="datetimeFigureOut">
               <a:rPr lang="en-US" smtClean="0"/>
-              <a:t>10/25/24</a:t>
+              <a:t>10/31/24</a:t>
             </a:fld>
             <a:endParaRPr lang="en-US"/>
           </a:p>
@@ -2350,7 +2356,7 @@
           <a:p>
             <a:fld id="{5A81D81A-14AD-CE44-B3D9-33FA66F0BC38}" type="datetimeFigureOut">
               <a:rPr lang="en-US" smtClean="0"/>
-              <a:t>10/25/24</a:t>
+              <a:t>10/31/24</a:t>
             </a:fld>
             <a:endParaRPr lang="en-US"/>
           </a:p>
@@ -2563,7 +2569,7 @@
           <a:p>
             <a:fld id="{5A81D81A-14AD-CE44-B3D9-33FA66F0BC38}" type="datetimeFigureOut">
               <a:rPr lang="en-US" smtClean="0"/>
-              <a:t>10/25/24</a:t>
+              <a:t>10/31/24</a:t>
             </a:fld>
             <a:endParaRPr lang="en-US"/>
           </a:p>
@@ -3200,6 +3206,477 @@
 </p:sld>
 </file>
 
+<file path=ppt/slides/slide2.xml><?xml version="1.0" encoding="utf-8"?>
+<p:sld xmlns:a="http://schemas.openxmlformats.org/drawingml/2006/main" xmlns:r="http://schemas.openxmlformats.org/officeDocument/2006/relationships" xmlns:p="http://schemas.openxmlformats.org/presentationml/2006/main">
+  <p:cSld>
+    <p:bg>
+      <p:bgPr>
+        <a:solidFill>
+          <a:schemeClr val="bg1">
+            <a:lumMod val="95000"/>
+          </a:schemeClr>
+        </a:solidFill>
+        <a:effectLst/>
+      </p:bgPr>
+    </p:bg>
+    <p:spTree>
+      <p:nvGrpSpPr>
+        <p:cNvPr id="1" name="">
+          <a:extLst>
+            <a:ext uri="{FF2B5EF4-FFF2-40B4-BE49-F238E27FC236}">
+              <a16:creationId xmlns:a16="http://schemas.microsoft.com/office/drawing/2014/main" id="{F013E13A-AE9E-150B-8A3D-73D70188AD04}"/>
+            </a:ext>
+          </a:extLst>
+        </p:cNvPr>
+        <p:cNvGrpSpPr/>
+        <p:nvPr/>
+      </p:nvGrpSpPr>
+      <p:grpSpPr>
+        <a:xfrm>
+          <a:off x="0" y="0"/>
+          <a:ext cx="0" cy="0"/>
+          <a:chOff x="0" y="0"/>
+          <a:chExt cx="0" cy="0"/>
+        </a:xfrm>
+      </p:grpSpPr>
+      <p:pic>
+        <p:nvPicPr>
+          <p:cNvPr id="1026" name="Picture 2">
+            <a:extLst>
+              <a:ext uri="{FF2B5EF4-FFF2-40B4-BE49-F238E27FC236}">
+                <a16:creationId xmlns:a16="http://schemas.microsoft.com/office/drawing/2014/main" id="{FF4DC69E-E581-DC6D-707D-8992CD8FAE25}"/>
+              </a:ext>
+            </a:extLst>
+          </p:cNvPr>
+          <p:cNvPicPr>
+            <a:picLocks noChangeAspect="1" noChangeArrowheads="1"/>
+          </p:cNvPicPr>
+          <p:nvPr/>
+        </p:nvPicPr>
+        <p:blipFill>
+          <a:blip r:embed="rId2">
+            <a:extLst>
+              <a:ext uri="{28A0092B-C50C-407E-A947-70E740481C1C}">
+                <a14:useLocalDpi xmlns:a14="http://schemas.microsoft.com/office/drawing/2010/main" val="0"/>
+              </a:ext>
+            </a:extLst>
+          </a:blip>
+          <a:srcRect/>
+          <a:stretch>
+            <a:fillRect/>
+          </a:stretch>
+        </p:blipFill>
+        <p:spPr bwMode="auto">
+          <a:xfrm>
+            <a:off x="1143000" y="0"/>
+            <a:ext cx="6858000" cy="6858000"/>
+          </a:xfrm>
+          <a:prstGeom prst="rect">
+            <a:avLst/>
+          </a:prstGeom>
+          <a:noFill/>
+          <a:extLst>
+            <a:ext uri="{909E8E84-426E-40DD-AFC4-6F175D3DCCD1}">
+              <a14:hiddenFill xmlns:a14="http://schemas.microsoft.com/office/drawing/2010/main">
+                <a:solidFill>
+                  <a:srgbClr val="FFFFFF"/>
+                </a:solidFill>
+              </a14:hiddenFill>
+            </a:ext>
+          </a:extLst>
+        </p:spPr>
+      </p:pic>
+      <p:sp>
+        <p:nvSpPr>
+          <p:cNvPr id="4" name="Arc 3">
+            <a:extLst>
+              <a:ext uri="{FF2B5EF4-FFF2-40B4-BE49-F238E27FC236}">
+                <a16:creationId xmlns:a16="http://schemas.microsoft.com/office/drawing/2014/main" id="{BCE85339-991F-8974-8512-2EEBE8C19E06}"/>
+              </a:ext>
+            </a:extLst>
+          </p:cNvPr>
+          <p:cNvSpPr/>
+          <p:nvPr/>
+        </p:nvSpPr>
+        <p:spPr>
+          <a:xfrm rot="425680">
+            <a:off x="5800066" y="1302833"/>
+            <a:ext cx="634116" cy="775371"/>
+          </a:xfrm>
+          <a:prstGeom prst="arc">
+            <a:avLst>
+              <a:gd name="adj1" fmla="val 16200000"/>
+              <a:gd name="adj2" fmla="val 18859708"/>
+            </a:avLst>
+          </a:prstGeom>
+        </p:spPr>
+        <p:style>
+          <a:lnRef idx="2">
+            <a:schemeClr val="accent1"/>
+          </a:lnRef>
+          <a:fillRef idx="0">
+            <a:schemeClr val="accent1"/>
+          </a:fillRef>
+          <a:effectRef idx="1">
+            <a:schemeClr val="accent1"/>
+          </a:effectRef>
+          <a:fontRef idx="minor">
+            <a:schemeClr val="tx1"/>
+          </a:fontRef>
+        </p:style>
+        <p:txBody>
+          <a:bodyPr rtlCol="0" anchor="ctr"/>
+          <a:lstStyle/>
+          <a:p>
+            <a:pPr algn="ctr"/>
+            <a:endParaRPr lang="en-US"/>
+          </a:p>
+        </p:txBody>
+      </p:sp>
+      <p:sp>
+        <p:nvSpPr>
+          <p:cNvPr id="5" name="TextBox 4">
+            <a:extLst>
+              <a:ext uri="{FF2B5EF4-FFF2-40B4-BE49-F238E27FC236}">
+                <a16:creationId xmlns:a16="http://schemas.microsoft.com/office/drawing/2014/main" id="{2020A9B9-5A89-2DB0-E99C-0F4C746196E3}"/>
+              </a:ext>
+            </a:extLst>
+          </p:cNvPr>
+          <p:cNvSpPr txBox="1"/>
+          <p:nvPr/>
+        </p:nvSpPr>
+        <p:spPr>
+          <a:xfrm>
+            <a:off x="6445820" y="851144"/>
+            <a:ext cx="695640" cy="276999"/>
+          </a:xfrm>
+          <a:prstGeom prst="rect">
+            <a:avLst/>
+          </a:prstGeom>
+          <a:noFill/>
+        </p:spPr>
+        <p:txBody>
+          <a:bodyPr wrap="none" rtlCol="0">
+            <a:spAutoFit/>
+          </a:bodyPr>
+          <a:lstStyle/>
+          <a:p>
+            <a:r>
+              <a:rPr lang="en-US" sz="1200" dirty="0" err="1"/>
+              <a:t>rotação</a:t>
+            </a:r>
+            <a:endParaRPr lang="en-US" sz="1200" dirty="0"/>
+          </a:p>
+        </p:txBody>
+      </p:sp>
+      <p:sp>
+        <p:nvSpPr>
+          <p:cNvPr id="6" name="Left Brace 5">
+            <a:extLst>
+              <a:ext uri="{FF2B5EF4-FFF2-40B4-BE49-F238E27FC236}">
+                <a16:creationId xmlns:a16="http://schemas.microsoft.com/office/drawing/2014/main" id="{CC7DB5AE-1A87-611C-F551-00121080766D}"/>
+              </a:ext>
+            </a:extLst>
+          </p:cNvPr>
+          <p:cNvSpPr/>
+          <p:nvPr/>
+        </p:nvSpPr>
+        <p:spPr>
+          <a:xfrm rot="14295367">
+            <a:off x="6346906" y="1575606"/>
+            <a:ext cx="197827" cy="515938"/>
+          </a:xfrm>
+          <a:prstGeom prst="leftBrace">
+            <a:avLst>
+              <a:gd name="adj1" fmla="val 68192"/>
+              <a:gd name="adj2" fmla="val 53454"/>
+            </a:avLst>
+          </a:prstGeom>
+        </p:spPr>
+        <p:style>
+          <a:lnRef idx="2">
+            <a:schemeClr val="accent1"/>
+          </a:lnRef>
+          <a:fillRef idx="0">
+            <a:schemeClr val="accent1"/>
+          </a:fillRef>
+          <a:effectRef idx="1">
+            <a:schemeClr val="accent1"/>
+          </a:effectRef>
+          <a:fontRef idx="minor">
+            <a:schemeClr val="tx1"/>
+          </a:fontRef>
+        </p:style>
+        <p:txBody>
+          <a:bodyPr rtlCol="0" anchor="ctr"/>
+          <a:lstStyle/>
+          <a:p>
+            <a:pPr algn="ctr"/>
+            <a:endParaRPr lang="en-US"/>
+          </a:p>
+        </p:txBody>
+      </p:sp>
+      <p:sp>
+        <p:nvSpPr>
+          <p:cNvPr id="7" name="TextBox 6">
+            <a:extLst>
+              <a:ext uri="{FF2B5EF4-FFF2-40B4-BE49-F238E27FC236}">
+                <a16:creationId xmlns:a16="http://schemas.microsoft.com/office/drawing/2014/main" id="{FDD2F4A5-AD58-9B3E-5EDB-DAFD87601BDE}"/>
+              </a:ext>
+            </a:extLst>
+          </p:cNvPr>
+          <p:cNvSpPr txBox="1"/>
+          <p:nvPr/>
+        </p:nvSpPr>
+        <p:spPr>
+          <a:xfrm>
+            <a:off x="6538305" y="1833575"/>
+            <a:ext cx="542841" cy="276999"/>
+          </a:xfrm>
+          <a:prstGeom prst="rect">
+            <a:avLst/>
+          </a:prstGeom>
+          <a:noFill/>
+        </p:spPr>
+        <p:txBody>
+          <a:bodyPr wrap="none" rtlCol="0">
+            <a:spAutoFit/>
+          </a:bodyPr>
+          <a:lstStyle/>
+          <a:p>
+            <a:r>
+              <a:rPr lang="en-US" sz="1200" dirty="0"/>
+              <a:t>scale</a:t>
+            </a:r>
+          </a:p>
+        </p:txBody>
+      </p:sp>
+      <p:sp>
+        <p:nvSpPr>
+          <p:cNvPr id="3" name="Left Brace 2">
+            <a:extLst>
+              <a:ext uri="{FF2B5EF4-FFF2-40B4-BE49-F238E27FC236}">
+                <a16:creationId xmlns:a16="http://schemas.microsoft.com/office/drawing/2014/main" id="{C5E43973-5F49-135F-5618-24BD58202202}"/>
+              </a:ext>
+            </a:extLst>
+          </p:cNvPr>
+          <p:cNvSpPr/>
+          <p:nvPr/>
+        </p:nvSpPr>
+        <p:spPr>
+          <a:xfrm rot="18395713">
+            <a:off x="5916470" y="1849300"/>
+            <a:ext cx="204801" cy="235361"/>
+          </a:xfrm>
+          <a:prstGeom prst="leftBrace">
+            <a:avLst>
+              <a:gd name="adj1" fmla="val 68192"/>
+              <a:gd name="adj2" fmla="val 53454"/>
+            </a:avLst>
+          </a:prstGeom>
+          <a:ln>
+            <a:solidFill>
+              <a:schemeClr val="accent3">
+                <a:lumMod val="60000"/>
+                <a:lumOff val="40000"/>
+              </a:schemeClr>
+            </a:solidFill>
+          </a:ln>
+        </p:spPr>
+        <p:style>
+          <a:lnRef idx="2">
+            <a:schemeClr val="accent1"/>
+          </a:lnRef>
+          <a:fillRef idx="0">
+            <a:schemeClr val="accent1"/>
+          </a:fillRef>
+          <a:effectRef idx="1">
+            <a:schemeClr val="accent1"/>
+          </a:effectRef>
+          <a:fontRef idx="minor">
+            <a:schemeClr val="tx1"/>
+          </a:fontRef>
+        </p:style>
+        <p:txBody>
+          <a:bodyPr rtlCol="0" anchor="ctr"/>
+          <a:lstStyle/>
+          <a:p>
+            <a:pPr algn="ctr"/>
+            <a:endParaRPr lang="en-US"/>
+          </a:p>
+        </p:txBody>
+      </p:sp>
+      <p:sp>
+        <p:nvSpPr>
+          <p:cNvPr id="8" name="TextBox 7">
+            <a:extLst>
+              <a:ext uri="{FF2B5EF4-FFF2-40B4-BE49-F238E27FC236}">
+                <a16:creationId xmlns:a16="http://schemas.microsoft.com/office/drawing/2014/main" id="{10AC82F6-0B6D-D396-67E6-BFD4696B708C}"/>
+              </a:ext>
+            </a:extLst>
+          </p:cNvPr>
+          <p:cNvSpPr txBox="1"/>
+          <p:nvPr/>
+        </p:nvSpPr>
+        <p:spPr>
+          <a:xfrm>
+            <a:off x="5633545" y="2228193"/>
+            <a:ext cx="2203937" cy="276999"/>
+          </a:xfrm>
+          <a:prstGeom prst="rect">
+            <a:avLst/>
+          </a:prstGeom>
+          <a:noFill/>
+        </p:spPr>
+        <p:txBody>
+          <a:bodyPr wrap="none" rtlCol="0">
+            <a:spAutoFit/>
+          </a:bodyPr>
+          <a:lstStyle/>
+          <a:p>
+            <a:r>
+              <a:rPr lang="en-US" sz="1200" dirty="0"/>
+              <a:t>K, entre 0 (m = p1) e 1 (m = p2) </a:t>
+            </a:r>
+          </a:p>
+        </p:txBody>
+      </p:sp>
+      <p:sp>
+        <p:nvSpPr>
+          <p:cNvPr id="9" name="TextBox 8">
+            <a:extLst>
+              <a:ext uri="{FF2B5EF4-FFF2-40B4-BE49-F238E27FC236}">
+                <a16:creationId xmlns:a16="http://schemas.microsoft.com/office/drawing/2014/main" id="{8D22E4FA-86BA-0736-80F6-837CF5E87F8F}"/>
+              </a:ext>
+            </a:extLst>
+          </p:cNvPr>
+          <p:cNvSpPr txBox="1"/>
+          <p:nvPr/>
+        </p:nvSpPr>
+        <p:spPr>
+          <a:xfrm>
+            <a:off x="4456488" y="1128143"/>
+            <a:ext cx="877163" cy="369332"/>
+          </a:xfrm>
+          <a:prstGeom prst="rect">
+            <a:avLst/>
+          </a:prstGeom>
+          <a:noFill/>
+        </p:spPr>
+        <p:txBody>
+          <a:bodyPr wrap="none" rtlCol="0">
+            <a:spAutoFit/>
+          </a:bodyPr>
+          <a:lstStyle/>
+          <a:p>
+            <a:r>
+              <a:rPr lang="en-US" dirty="0"/>
+              <a:t>middle</a:t>
+            </a:r>
+          </a:p>
+        </p:txBody>
+      </p:sp>
+      <p:sp>
+        <p:nvSpPr>
+          <p:cNvPr id="10" name="TextBox 9">
+            <a:extLst>
+              <a:ext uri="{FF2B5EF4-FFF2-40B4-BE49-F238E27FC236}">
+                <a16:creationId xmlns:a16="http://schemas.microsoft.com/office/drawing/2014/main" id="{F8858498-1B12-BBD5-5943-65544D6F7855}"/>
+              </a:ext>
+            </a:extLst>
+          </p:cNvPr>
+          <p:cNvSpPr txBox="1"/>
+          <p:nvPr/>
+        </p:nvSpPr>
+        <p:spPr>
+          <a:xfrm>
+            <a:off x="3242543" y="366143"/>
+            <a:ext cx="998991" cy="261610"/>
+          </a:xfrm>
+          <a:prstGeom prst="rect">
+            <a:avLst/>
+          </a:prstGeom>
+          <a:noFill/>
+        </p:spPr>
+        <p:txBody>
+          <a:bodyPr wrap="none" rtlCol="0">
+            <a:spAutoFit/>
+          </a:bodyPr>
+          <a:lstStyle/>
+          <a:p>
+            <a:r>
+              <a:rPr lang="en-US" sz="1100" dirty="0" err="1">
+                <a:solidFill>
+                  <a:srgbClr val="0070C0"/>
+                </a:solidFill>
+              </a:rPr>
+              <a:t>normal_point</a:t>
+            </a:r>
+            <a:endParaRPr lang="en-US" sz="1100" dirty="0">
+              <a:solidFill>
+                <a:srgbClr val="0070C0"/>
+              </a:solidFill>
+            </a:endParaRPr>
+          </a:p>
+        </p:txBody>
+      </p:sp>
+      <p:sp>
+        <p:nvSpPr>
+          <p:cNvPr id="11" name="TextBox 10">
+            <a:extLst>
+              <a:ext uri="{FF2B5EF4-FFF2-40B4-BE49-F238E27FC236}">
+                <a16:creationId xmlns:a16="http://schemas.microsoft.com/office/drawing/2014/main" id="{D58A706B-6442-D9F7-9EB4-1A685C8B71CC}"/>
+              </a:ext>
+            </a:extLst>
+          </p:cNvPr>
+          <p:cNvSpPr txBox="1"/>
+          <p:nvPr/>
+        </p:nvSpPr>
+        <p:spPr>
+          <a:xfrm>
+            <a:off x="4462353" y="302462"/>
+            <a:ext cx="721672" cy="261610"/>
+          </a:xfrm>
+          <a:prstGeom prst="rect">
+            <a:avLst/>
+          </a:prstGeom>
+          <a:noFill/>
+        </p:spPr>
+        <p:txBody>
+          <a:bodyPr wrap="none" rtlCol="0">
+            <a:spAutoFit/>
+          </a:bodyPr>
+          <a:lstStyle/>
+          <a:p>
+            <a:r>
+              <a:rPr lang="en-US" sz="1100" dirty="0" err="1">
+                <a:solidFill>
+                  <a:srgbClr val="FF0000"/>
+                </a:solidFill>
+              </a:rPr>
+              <a:t>dir_point</a:t>
+            </a:r>
+            <a:endParaRPr lang="en-US" sz="1100" dirty="0">
+              <a:solidFill>
+                <a:srgbClr val="FF0000"/>
+              </a:solidFill>
+            </a:endParaRPr>
+          </a:p>
+        </p:txBody>
+      </p:sp>
+    </p:spTree>
+    <p:extLst>
+      <p:ext uri="{BB962C8B-B14F-4D97-AF65-F5344CB8AC3E}">
+        <p14:creationId xmlns:p14="http://schemas.microsoft.com/office/powerpoint/2010/main" val="632031489"/>
+      </p:ext>
+    </p:extLst>
+  </p:cSld>
+  <p:clrMapOvr>
+    <a:masterClrMapping/>
+  </p:clrMapOvr>
+</p:sld>
+</file>
+
 <file path=ppt/theme/theme1.xml><?xml version="1.0" encoding="utf-8"?>
 <a:theme xmlns:a="http://schemas.openxmlformats.org/drawingml/2006/main" name="Office Theme">
   <a:themeElements>

</xml_diff>